<commit_message>
update install and lecture 2
</commit_message>
<xml_diff>
--- a/LectureFiles/cshl/2018/RNASeq_Module2_Lecture.pptx
+++ b/LectureFiles/cshl/2018/RNASeq_Module2_Lecture.pptx
@@ -181,7 +181,7 @@
   </p:defaultTextStyle>
   <p:extLst>
     <p:ext uri="{EFAFB233-063F-42B5-8137-9DF3F51BA10A}">
-      <p15:sldGuideLst xmlns:p15="http://schemas.microsoft.com/office/powerpoint/2012/main" xmlns="">
+      <p15:sldGuideLst xmlns="" xmlns:p15="http://schemas.microsoft.com/office/powerpoint/2012/main">
         <p15:guide id="1" orient="horz" pos="2160">
           <p15:clr>
             <a:srgbClr val="A4A3A4"/>
@@ -301,7 +301,7 @@
               <a:pPr>
                 <a:defRPr/>
               </a:pPr>
-              <a:t>11/13/17</a:t>
+              <a:t>11/12/18</a:t>
             </a:fld>
             <a:endParaRPr lang="en-US"/>
           </a:p>
@@ -508,7 +508,7 @@
               <a:pPr>
                 <a:defRPr/>
               </a:pPr>
-              <a:t>11/13/17</a:t>
+              <a:t>11/12/18</a:t>
             </a:fld>
             <a:endParaRPr lang="en-US"/>
           </a:p>
@@ -4553,7 +4553,7 @@
               <a:pPr>
                 <a:defRPr/>
               </a:pPr>
-              <a:t>11/13/17</a:t>
+              <a:t>11/12/18</a:t>
             </a:fld>
             <a:endParaRPr lang="en-US"/>
           </a:p>
@@ -8735,12 +8735,47 @@
               <a:defRPr/>
             </a:pPr>
             <a:r>
-              <a:rPr lang="en-US" sz="1600" dirty="0" smtClean="0">
+              <a:rPr lang="en-US" sz="1600" dirty="0" err="1">
                 <a:latin typeface="Calibri"/>
-                <a:ea typeface="+mj-ea"/>
                 <a:cs typeface="Calibri"/>
               </a:rPr>
-              <a:t>Malachi Griffith, Obi Griffith, Jason Walker, Alex Wagner</a:t>
+              <a:t>Kelsy</a:t>
+            </a:r>
+            <a:r>
+              <a:rPr lang="en-US" sz="1600" dirty="0">
+                <a:latin typeface="Calibri"/>
+                <a:cs typeface="Calibri"/>
+              </a:rPr>
+              <a:t> </a:t>
+            </a:r>
+            <a:r>
+              <a:rPr lang="en-US" sz="1600" dirty="0" err="1">
+                <a:latin typeface="Calibri"/>
+                <a:cs typeface="Calibri"/>
+              </a:rPr>
+              <a:t>Cotto</a:t>
+            </a:r>
+            <a:r>
+              <a:rPr lang="en-US" sz="1600" dirty="0">
+                <a:latin typeface="Calibri"/>
+                <a:cs typeface="Calibri"/>
+              </a:rPr>
+              <a:t>, Obi Griffith, Malachi Griffith, </a:t>
+            </a:r>
+          </a:p>
+          <a:p>
+            <a:pPr fontAlgn="auto">
+              <a:spcAft>
+                <a:spcPts val="0"/>
+              </a:spcAft>
+              <a:defRPr/>
+            </a:pPr>
+            <a:r>
+              <a:rPr lang="en-US" sz="1600" dirty="0">
+                <a:latin typeface="Calibri"/>
+                <a:cs typeface="Calibri"/>
+              </a:rPr>
+              <a:t>Alex Wagner, Jason Walker</a:t>
             </a:r>
           </a:p>
           <a:p>
@@ -8784,55 +8819,9 @@
                   </a:solidFill>
                 </a:ln>
                 <a:latin typeface="Calibri"/>
-                <a:ea typeface="+mn-ea"/>
                 <a:cs typeface="Calibri"/>
               </a:rPr>
-              <a:t>November </a:t>
-            </a:r>
-            <a:r>
-              <a:rPr lang="en-US" sz="1400" dirty="0" smtClean="0">
-                <a:ln w="1270">
-                  <a:solidFill>
-                    <a:schemeClr val="tx1">
-                      <a:alpha val="38000"/>
-                    </a:schemeClr>
-                  </a:solidFill>
-                </a:ln>
-                <a:latin typeface="Calibri"/>
-                <a:ea typeface="+mn-ea"/>
-                <a:cs typeface="Calibri"/>
-              </a:rPr>
-              <a:t>7 </a:t>
-            </a:r>
-            <a:r>
-              <a:rPr lang="en-US" sz="1400" dirty="0">
-                <a:ln w="1270">
-                  <a:solidFill>
-                    <a:schemeClr val="tx1">
-                      <a:alpha val="38000"/>
-                    </a:schemeClr>
-                  </a:solidFill>
-                </a:ln>
-                <a:latin typeface="Calibri"/>
-                <a:ea typeface="+mn-ea"/>
-                <a:cs typeface="Calibri"/>
-              </a:rPr>
-              <a:t>- </a:t>
-            </a:r>
-            <a:r>
-              <a:rPr lang="en-US" sz="1400" dirty="0" smtClean="0">
-                <a:ln w="1270">
-                  <a:solidFill>
-                    <a:schemeClr val="tx1">
-                      <a:alpha val="38000"/>
-                    </a:schemeClr>
-                  </a:solidFill>
-                </a:ln>
-                <a:latin typeface="Calibri"/>
-                <a:ea typeface="+mn-ea"/>
-                <a:cs typeface="Calibri"/>
-              </a:rPr>
-              <a:t>18, 2017</a:t>
+              <a:t>November 6- 18, 2018</a:t>
             </a:r>
           </a:p>
         </p:txBody>

</xml_diff>